<commit_message>
Adjustments to both ALK ppt and handouts
</commit_message>
<xml_diff>
--- a/Slides/02_AgeLengthKey.pptx
+++ b/Slides/02_AgeLengthKey.pptx
@@ -4016,7 +4016,17 @@
           <a:p>
             <a:r>
               <a:rPr lang="en-US" dirty="0" smtClean="0"/>
-              <a:t>Isermann-Knight (2005) Method</a:t>
+              <a:t>Concept, Construction, </a:t>
+            </a:r>
+          </a:p>
+          <a:p>
+            <a:r>
+              <a:rPr lang="en-US" dirty="0" smtClean="0"/>
+              <a:t>And </a:t>
+            </a:r>
+            <a:r>
+              <a:rPr lang="en-US" dirty="0" smtClean="0"/>
+              <a:t>Application</a:t>
             </a:r>
             <a:endParaRPr lang="en-US" dirty="0"/>
           </a:p>
@@ -5369,30 +5379,21 @@
                             </p:childTnLst>
                           </p:cTn>
                         </p:par>
-                      </p:childTnLst>
-                    </p:cTn>
-                  </p:par>
-                  <p:par>
-                    <p:cTn id="18" fill="hold">
-                      <p:stCondLst>
-                        <p:cond delay="indefinite"/>
-                      </p:stCondLst>
-                      <p:childTnLst>
                         <p:par>
-                          <p:cTn id="19" fill="hold">
+                          <p:cTn id="18" fill="hold">
                             <p:stCondLst>
                               <p:cond delay="0"/>
                             </p:stCondLst>
                             <p:childTnLst>
                               <p:par>
-                                <p:cTn id="20" presetID="1" presetClass="entr" presetSubtype="0" fill="hold" grpId="0" nodeType="clickEffect">
+                                <p:cTn id="19" presetID="1" presetClass="entr" presetSubtype="0" fill="hold" grpId="0" nodeType="afterEffect">
                                   <p:stCondLst>
-                                    <p:cond delay="0"/>
+                                    <p:cond delay="500"/>
                                   </p:stCondLst>
                                   <p:childTnLst>
                                     <p:set>
                                       <p:cBhvr>
-                                        <p:cTn id="21" dur="1" fill="hold">
+                                        <p:cTn id="20" dur="1" fill="hold">
                                           <p:stCondLst>
                                             <p:cond delay="0"/>
                                           </p:stCondLst>
@@ -5418,30 +5419,21 @@
                             </p:childTnLst>
                           </p:cTn>
                         </p:par>
-                      </p:childTnLst>
-                    </p:cTn>
-                  </p:par>
-                  <p:par>
-                    <p:cTn id="22" fill="hold">
-                      <p:stCondLst>
-                        <p:cond delay="indefinite"/>
-                      </p:stCondLst>
-                      <p:childTnLst>
                         <p:par>
-                          <p:cTn id="23" fill="hold">
+                          <p:cTn id="21" fill="hold">
                             <p:stCondLst>
-                              <p:cond delay="0"/>
+                              <p:cond delay="500"/>
                             </p:stCondLst>
                             <p:childTnLst>
                               <p:par>
-                                <p:cTn id="24" presetID="1" presetClass="entr" presetSubtype="0" fill="hold" grpId="0" nodeType="clickEffect">
+                                <p:cTn id="22" presetID="1" presetClass="entr" presetSubtype="0" fill="hold" grpId="0" nodeType="afterEffect">
                                   <p:stCondLst>
-                                    <p:cond delay="0"/>
+                                    <p:cond delay="500"/>
                                   </p:stCondLst>
                                   <p:childTnLst>
                                     <p:set>
                                       <p:cBhvr>
-                                        <p:cTn id="25" dur="1" fill="hold">
+                                        <p:cTn id="23" dur="1" fill="hold">
                                           <p:stCondLst>
                                             <p:cond delay="0"/>
                                           </p:stCondLst>
@@ -5467,30 +5459,21 @@
                             </p:childTnLst>
                           </p:cTn>
                         </p:par>
-                      </p:childTnLst>
-                    </p:cTn>
-                  </p:par>
-                  <p:par>
-                    <p:cTn id="26" fill="hold">
-                      <p:stCondLst>
-                        <p:cond delay="indefinite"/>
-                      </p:stCondLst>
-                      <p:childTnLst>
                         <p:par>
-                          <p:cTn id="27" fill="hold">
+                          <p:cTn id="24" fill="hold">
                             <p:stCondLst>
-                              <p:cond delay="0"/>
+                              <p:cond delay="1000"/>
                             </p:stCondLst>
                             <p:childTnLst>
                               <p:par>
-                                <p:cTn id="28" presetID="1" presetClass="entr" presetSubtype="0" fill="hold" grpId="0" nodeType="clickEffect">
+                                <p:cTn id="25" presetID="1" presetClass="entr" presetSubtype="0" fill="hold" grpId="0" nodeType="afterEffect">
                                   <p:stCondLst>
-                                    <p:cond delay="0"/>
+                                    <p:cond delay="500"/>
                                   </p:stCondLst>
                                   <p:childTnLst>
                                     <p:set>
                                       <p:cBhvr>
-                                        <p:cTn id="29" dur="1" fill="hold">
+                                        <p:cTn id="26" dur="1" fill="hold">
                                           <p:stCondLst>
                                             <p:cond delay="0"/>
                                           </p:stCondLst>
@@ -5795,11 +5778,7 @@
             <a:pPr lvl="1"/>
             <a:r>
               <a:rPr lang="en-US" sz="2400" dirty="0" smtClean="0"/>
-              <a:t>Choose </a:t>
-            </a:r>
-            <a:r>
-              <a:rPr lang="en-US" sz="2400" dirty="0" smtClean="0"/>
-              <a:t>two </a:t>
+              <a:t>Choose two </a:t>
             </a:r>
             <a:r>
               <a:rPr lang="en-US" sz="2400" dirty="0"/>
@@ -5838,8 +5817,8 @@
               <a:t>% chance of being </a:t>
             </a:r>
             <a:r>
-              <a:rPr lang="en-US" sz="2400" dirty="0" err="1" smtClean="0"/>
-              <a:t>selecteod</a:t>
+              <a:rPr lang="en-US" sz="2400" dirty="0" smtClean="0"/>
+              <a:t>selected</a:t>
             </a:r>
             <a:r>
               <a:rPr lang="en-US" sz="2400" dirty="0"/>
@@ -6895,7 +6874,13 @@
               <a:rPr lang="en-US" sz="2400" dirty="0">
                 <a:sym typeface="Wingdings" pitchFamily="2" charset="2"/>
               </a:rPr>
-              <a:t>these ages.</a:t>
+              <a:t>these </a:t>
+            </a:r>
+            <a:r>
+              <a:rPr lang="en-US" sz="2400" dirty="0" smtClean="0">
+                <a:sym typeface="Wingdings" pitchFamily="2" charset="2"/>
+              </a:rPr>
+              <a:t>ages</a:t>
             </a:r>
             <a:endParaRPr lang="en-US" sz="2000" b="1" dirty="0"/>
           </a:p>
@@ -7847,30 +7832,21 @@
                             </p:childTnLst>
                           </p:cTn>
                         </p:par>
-                      </p:childTnLst>
-                    </p:cTn>
-                  </p:par>
-                  <p:par>
-                    <p:cTn id="20" fill="hold">
-                      <p:stCondLst>
-                        <p:cond delay="indefinite"/>
-                      </p:stCondLst>
-                      <p:childTnLst>
                         <p:par>
-                          <p:cTn id="21" fill="hold">
+                          <p:cTn id="20" fill="hold">
                             <p:stCondLst>
                               <p:cond delay="0"/>
                             </p:stCondLst>
                             <p:childTnLst>
                               <p:par>
-                                <p:cTn id="22" presetID="9" presetClass="entr" presetSubtype="0" fill="hold" grpId="0" nodeType="clickEffect">
+                                <p:cTn id="21" presetID="9" presetClass="entr" presetSubtype="0" fill="hold" grpId="0" nodeType="afterEffect">
                                   <p:stCondLst>
                                     <p:cond delay="0"/>
                                   </p:stCondLst>
                                   <p:childTnLst>
                                     <p:set>
                                       <p:cBhvr>
-                                        <p:cTn id="23" dur="1" fill="hold">
+                                        <p:cTn id="22" dur="1" fill="hold">
                                           <p:stCondLst>
                                             <p:cond delay="0"/>
                                           </p:stCondLst>
@@ -7888,7 +7864,7 @@
                                     </p:set>
                                     <p:animEffect transition="in" filter="dissolve">
                                       <p:cBhvr>
-                                        <p:cTn id="24" dur="500"/>
+                                        <p:cTn id="23" dur="500"/>
                                         <p:tgtEl>
                                           <p:spTgt spid="271373"/>
                                         </p:tgtEl>
@@ -7901,20 +7877,20 @@
                           </p:cTn>
                         </p:par>
                         <p:par>
-                          <p:cTn id="25" fill="hold">
+                          <p:cTn id="24" fill="hold">
                             <p:stCondLst>
                               <p:cond delay="500"/>
                             </p:stCondLst>
                             <p:childTnLst>
                               <p:par>
-                                <p:cTn id="26" presetID="9" presetClass="entr" presetSubtype="0" fill="hold" grpId="0" nodeType="afterEffect">
+                                <p:cTn id="25" presetID="9" presetClass="entr" presetSubtype="0" fill="hold" grpId="0" nodeType="afterEffect">
                                   <p:stCondLst>
                                     <p:cond delay="0"/>
                                   </p:stCondLst>
                                   <p:childTnLst>
                                     <p:set>
                                       <p:cBhvr>
-                                        <p:cTn id="27" dur="1" fill="hold">
+                                        <p:cTn id="26" dur="1" fill="hold">
                                           <p:stCondLst>
                                             <p:cond delay="0"/>
                                           </p:stCondLst>
@@ -7932,7 +7908,7 @@
                                     </p:set>
                                     <p:animEffect transition="in" filter="dissolve">
                                       <p:cBhvr>
-                                        <p:cTn id="28" dur="500"/>
+                                        <p:cTn id="27" dur="500"/>
                                         <p:tgtEl>
                                           <p:spTgt spid="271374"/>
                                         </p:tgtEl>
@@ -7945,20 +7921,20 @@
                           </p:cTn>
                         </p:par>
                         <p:par>
-                          <p:cTn id="29" fill="hold">
+                          <p:cTn id="28" fill="hold">
                             <p:stCondLst>
                               <p:cond delay="1000"/>
                             </p:stCondLst>
                             <p:childTnLst>
                               <p:par>
-                                <p:cTn id="30" presetID="9" presetClass="entr" presetSubtype="0" fill="hold" grpId="0" nodeType="afterEffect">
+                                <p:cTn id="29" presetID="9" presetClass="entr" presetSubtype="0" fill="hold" grpId="0" nodeType="afterEffect">
                                   <p:stCondLst>
                                     <p:cond delay="0"/>
                                   </p:stCondLst>
                                   <p:childTnLst>
                                     <p:set>
                                       <p:cBhvr>
-                                        <p:cTn id="31" dur="1" fill="hold">
+                                        <p:cTn id="30" dur="1" fill="hold">
                                           <p:stCondLst>
                                             <p:cond delay="0"/>
                                           </p:stCondLst>
@@ -7976,7 +7952,7 @@
                                     </p:set>
                                     <p:animEffect transition="in" filter="dissolve">
                                       <p:cBhvr>
-                                        <p:cTn id="32" dur="500"/>
+                                        <p:cTn id="31" dur="500"/>
                                         <p:tgtEl>
                                           <p:spTgt spid="271375"/>
                                         </p:tgtEl>
@@ -8595,8 +8571,17 @@
               <a:rPr lang="en-US" sz="2400" dirty="0">
                 <a:sym typeface="Wingdings" pitchFamily="2" charset="2"/>
               </a:rPr>
-              <a:t>Extra fish was chosen to be age-3.</a:t>
-            </a:r>
+              <a:t>Extra fish was chosen to be </a:t>
+            </a:r>
+            <a:r>
+              <a:rPr lang="en-US" sz="2400" dirty="0" smtClean="0">
+                <a:sym typeface="Wingdings" pitchFamily="2" charset="2"/>
+              </a:rPr>
+              <a:t>age-3</a:t>
+            </a:r>
+            <a:endParaRPr lang="en-US" sz="2400" dirty="0">
+              <a:sym typeface="Wingdings" pitchFamily="2" charset="2"/>
+            </a:endParaRPr>
           </a:p>
           <a:p>
             <a:pPr marL="228600" indent="-228600">
@@ -8607,7 +8592,13 @@
               <a:rPr lang="en-US" sz="2400" dirty="0" smtClean="0">
                 <a:sym typeface="Wingdings" pitchFamily="2" charset="2"/>
               </a:rPr>
-              <a:t>Randomly assign these ages.</a:t>
+              <a:t>Randomly assign these </a:t>
+            </a:r>
+            <a:r>
+              <a:rPr lang="en-US" sz="2400" dirty="0" smtClean="0">
+                <a:sym typeface="Wingdings" pitchFamily="2" charset="2"/>
+              </a:rPr>
+              <a:t>ages</a:t>
             </a:r>
             <a:endParaRPr lang="en-US" sz="2000" b="1" dirty="0"/>
           </a:p>
@@ -9733,30 +9724,21 @@
                             </p:childTnLst>
                           </p:cTn>
                         </p:par>
-                      </p:childTnLst>
-                    </p:cTn>
-                  </p:par>
-                  <p:par>
-                    <p:cTn id="11" fill="hold">
-                      <p:stCondLst>
-                        <p:cond delay="indefinite"/>
-                      </p:stCondLst>
-                      <p:childTnLst>
                         <p:par>
-                          <p:cTn id="12" fill="hold">
+                          <p:cTn id="11" fill="hold">
                             <p:stCondLst>
-                              <p:cond delay="0"/>
+                              <p:cond delay="500"/>
                             </p:stCondLst>
                             <p:childTnLst>
                               <p:par>
-                                <p:cTn id="13" presetID="1" presetClass="entr" presetSubtype="0" fill="hold" nodeType="clickEffect">
+                                <p:cTn id="12" presetID="1" presetClass="entr" presetSubtype="0" fill="hold" nodeType="afterEffect">
                                   <p:stCondLst>
-                                    <p:cond delay="0"/>
+                                    <p:cond delay="1000"/>
                                   </p:stCondLst>
                                   <p:childTnLst>
                                     <p:set>
                                       <p:cBhvr>
-                                        <p:cTn id="14" dur="1" fill="hold">
+                                        <p:cTn id="13" dur="1" fill="hold">
                                           <p:stCondLst>
                                             <p:cond delay="0"/>
                                           </p:stCondLst>
@@ -9782,30 +9764,21 @@
                             </p:childTnLst>
                           </p:cTn>
                         </p:par>
-                      </p:childTnLst>
-                    </p:cTn>
-                  </p:par>
-                  <p:par>
-                    <p:cTn id="15" fill="hold">
-                      <p:stCondLst>
-                        <p:cond delay="indefinite"/>
-                      </p:stCondLst>
-                      <p:childTnLst>
                         <p:par>
-                          <p:cTn id="16" fill="hold">
+                          <p:cTn id="14" fill="hold">
                             <p:stCondLst>
-                              <p:cond delay="0"/>
+                              <p:cond delay="1500"/>
                             </p:stCondLst>
                             <p:childTnLst>
                               <p:par>
-                                <p:cTn id="17" presetID="1" presetClass="entr" presetSubtype="0" fill="hold" nodeType="clickEffect">
+                                <p:cTn id="15" presetID="1" presetClass="entr" presetSubtype="0" fill="hold" nodeType="afterEffect">
                                   <p:stCondLst>
-                                    <p:cond delay="0"/>
+                                    <p:cond delay="500"/>
                                   </p:stCondLst>
                                   <p:childTnLst>
                                     <p:set>
                                       <p:cBhvr>
-                                        <p:cTn id="18" dur="1" fill="hold">
+                                        <p:cTn id="16" dur="1" fill="hold">
                                           <p:stCondLst>
                                             <p:cond delay="0"/>
                                           </p:stCondLst>
@@ -9831,30 +9804,21 @@
                             </p:childTnLst>
                           </p:cTn>
                         </p:par>
-                      </p:childTnLst>
-                    </p:cTn>
-                  </p:par>
-                  <p:par>
-                    <p:cTn id="19" fill="hold">
-                      <p:stCondLst>
-                        <p:cond delay="indefinite"/>
-                      </p:stCondLst>
-                      <p:childTnLst>
                         <p:par>
-                          <p:cTn id="20" fill="hold">
+                          <p:cTn id="17" fill="hold">
                             <p:stCondLst>
-                              <p:cond delay="0"/>
+                              <p:cond delay="2000"/>
                             </p:stCondLst>
                             <p:childTnLst>
                               <p:par>
-                                <p:cTn id="21" presetID="1" presetClass="entr" presetSubtype="0" fill="hold" nodeType="clickEffect">
+                                <p:cTn id="18" presetID="1" presetClass="entr" presetSubtype="0" fill="hold" nodeType="afterEffect">
                                   <p:stCondLst>
-                                    <p:cond delay="0"/>
+                                    <p:cond delay="500"/>
                                   </p:stCondLst>
                                   <p:childTnLst>
                                     <p:set>
                                       <p:cBhvr>
-                                        <p:cTn id="22" dur="1" fill="hold">
+                                        <p:cTn id="19" dur="1" fill="hold">
                                           <p:stCondLst>
                                             <p:cond delay="0"/>
                                           </p:stCondLst>
@@ -9884,26 +9848,26 @@
                     </p:cTn>
                   </p:par>
                   <p:par>
-                    <p:cTn id="23" fill="hold">
+                    <p:cTn id="20" fill="hold">
                       <p:stCondLst>
                         <p:cond delay="indefinite"/>
                       </p:stCondLst>
                       <p:childTnLst>
                         <p:par>
-                          <p:cTn id="24" fill="hold">
+                          <p:cTn id="21" fill="hold">
                             <p:stCondLst>
                               <p:cond delay="0"/>
                             </p:stCondLst>
                             <p:childTnLst>
                               <p:par>
-                                <p:cTn id="25" presetID="1" presetClass="entr" presetSubtype="0" fill="hold" grpId="0" nodeType="clickEffect">
+                                <p:cTn id="22" presetID="1" presetClass="entr" presetSubtype="0" fill="hold" grpId="0" nodeType="clickEffect">
                                   <p:stCondLst>
                                     <p:cond delay="0"/>
                                   </p:stCondLst>
                                   <p:childTnLst>
                                     <p:set>
                                       <p:cBhvr>
-                                        <p:cTn id="26" dur="1" fill="hold">
+                                        <p:cTn id="23" dur="1" fill="hold">
                                           <p:stCondLst>
                                             <p:cond delay="0"/>
                                           </p:stCondLst>
@@ -9929,30 +9893,21 @@
                             </p:childTnLst>
                           </p:cTn>
                         </p:par>
-                      </p:childTnLst>
-                    </p:cTn>
-                  </p:par>
-                  <p:par>
-                    <p:cTn id="27" fill="hold">
-                      <p:stCondLst>
-                        <p:cond delay="indefinite"/>
-                      </p:stCondLst>
-                      <p:childTnLst>
                         <p:par>
-                          <p:cTn id="28" fill="hold">
+                          <p:cTn id="24" fill="hold">
                             <p:stCondLst>
                               <p:cond delay="0"/>
                             </p:stCondLst>
                             <p:childTnLst>
                               <p:par>
-                                <p:cTn id="29" presetID="22" presetClass="entr" presetSubtype="8" fill="hold" grpId="0" nodeType="clickEffect">
+                                <p:cTn id="25" presetID="22" presetClass="entr" presetSubtype="8" fill="hold" grpId="0" nodeType="afterEffect">
                                   <p:stCondLst>
-                                    <p:cond delay="0"/>
+                                    <p:cond delay="500"/>
                                   </p:stCondLst>
                                   <p:childTnLst>
                                     <p:set>
                                       <p:cBhvr>
-                                        <p:cTn id="30" dur="1" fill="hold">
+                                        <p:cTn id="26" dur="1" fill="hold">
                                           <p:stCondLst>
                                             <p:cond delay="0"/>
                                           </p:stCondLst>
@@ -9970,7 +9925,7 @@
                                     </p:set>
                                     <p:animEffect transition="in" filter="wipe(left)">
                                       <p:cBhvr>
-                                        <p:cTn id="31" dur="500"/>
+                                        <p:cTn id="27" dur="500"/>
                                         <p:tgtEl>
                                           <p:spTgt spid="272394"/>
                                         </p:tgtEl>
@@ -9983,20 +9938,20 @@
                           </p:cTn>
                         </p:par>
                         <p:par>
-                          <p:cTn id="32" fill="hold">
+                          <p:cTn id="28" fill="hold">
                             <p:stCondLst>
-                              <p:cond delay="500"/>
+                              <p:cond delay="1000"/>
                             </p:stCondLst>
                             <p:childTnLst>
                               <p:par>
-                                <p:cTn id="33" presetID="22" presetClass="entr" presetSubtype="8" fill="hold" grpId="0" nodeType="afterEffect">
+                                <p:cTn id="29" presetID="22" presetClass="entr" presetSubtype="8" fill="hold" grpId="0" nodeType="afterEffect">
                                   <p:stCondLst>
                                     <p:cond delay="0"/>
                                   </p:stCondLst>
                                   <p:childTnLst>
                                     <p:set>
                                       <p:cBhvr>
-                                        <p:cTn id="34" dur="1" fill="hold">
+                                        <p:cTn id="30" dur="1" fill="hold">
                                           <p:stCondLst>
                                             <p:cond delay="0"/>
                                           </p:stCondLst>
@@ -10014,7 +9969,7 @@
                                     </p:set>
                                     <p:animEffect transition="in" filter="wipe(left)">
                                       <p:cBhvr>
-                                        <p:cTn id="35" dur="500"/>
+                                        <p:cTn id="31" dur="500"/>
                                         <p:tgtEl>
                                           <p:spTgt spid="272395"/>
                                         </p:tgtEl>
@@ -10027,20 +9982,20 @@
                           </p:cTn>
                         </p:par>
                         <p:par>
-                          <p:cTn id="36" fill="hold">
+                          <p:cTn id="32" fill="hold">
                             <p:stCondLst>
-                              <p:cond delay="1000"/>
+                              <p:cond delay="1500"/>
                             </p:stCondLst>
                             <p:childTnLst>
                               <p:par>
-                                <p:cTn id="37" presetID="22" presetClass="entr" presetSubtype="8" fill="hold" grpId="0" nodeType="afterEffect">
+                                <p:cTn id="33" presetID="22" presetClass="entr" presetSubtype="8" fill="hold" grpId="0" nodeType="afterEffect">
                                   <p:stCondLst>
                                     <p:cond delay="0"/>
                                   </p:stCondLst>
                                   <p:childTnLst>
                                     <p:set>
                                       <p:cBhvr>
-                                        <p:cTn id="38" dur="1" fill="hold">
+                                        <p:cTn id="34" dur="1" fill="hold">
                                           <p:stCondLst>
                                             <p:cond delay="0"/>
                                           </p:stCondLst>
@@ -10058,7 +10013,7 @@
                                     </p:set>
                                     <p:animEffect transition="in" filter="wipe(left)">
                                       <p:cBhvr>
-                                        <p:cTn id="39" dur="500"/>
+                                        <p:cTn id="35" dur="500"/>
                                         <p:tgtEl>
                                           <p:spTgt spid="272396"/>
                                         </p:tgtEl>
@@ -10074,26 +10029,26 @@
                     </p:cTn>
                   </p:par>
                   <p:par>
-                    <p:cTn id="40" fill="hold">
+                    <p:cTn id="36" fill="hold">
                       <p:stCondLst>
                         <p:cond delay="indefinite"/>
                       </p:stCondLst>
                       <p:childTnLst>
                         <p:par>
-                          <p:cTn id="41" fill="hold">
+                          <p:cTn id="37" fill="hold">
                             <p:stCondLst>
                               <p:cond delay="0"/>
                             </p:stCondLst>
                             <p:childTnLst>
                               <p:par>
-                                <p:cTn id="42" presetID="1" presetClass="entr" presetSubtype="0" fill="hold" grpId="0" nodeType="clickEffect">
+                                <p:cTn id="38" presetID="1" presetClass="entr" presetSubtype="0" fill="hold" grpId="0" nodeType="clickEffect">
                                   <p:stCondLst>
                                     <p:cond delay="0"/>
                                   </p:stCondLst>
                                   <p:childTnLst>
                                     <p:set>
                                       <p:cBhvr>
-                                        <p:cTn id="43" dur="1" fill="hold">
+                                        <p:cTn id="39" dur="1" fill="hold">
                                           <p:stCondLst>
                                             <p:cond delay="0"/>
                                           </p:stCondLst>
@@ -10119,30 +10074,21 @@
                             </p:childTnLst>
                           </p:cTn>
                         </p:par>
-                      </p:childTnLst>
-                    </p:cTn>
-                  </p:par>
-                  <p:par>
-                    <p:cTn id="44" fill="hold">
-                      <p:stCondLst>
-                        <p:cond delay="indefinite"/>
-                      </p:stCondLst>
-                      <p:childTnLst>
                         <p:par>
-                          <p:cTn id="45" fill="hold">
+                          <p:cTn id="40" fill="hold">
                             <p:stCondLst>
                               <p:cond delay="0"/>
                             </p:stCondLst>
                             <p:childTnLst>
                               <p:par>
-                                <p:cTn id="46" presetID="9" presetClass="entr" presetSubtype="0" fill="hold" grpId="0" nodeType="clickEffect">
+                                <p:cTn id="41" presetID="9" presetClass="entr" presetSubtype="0" fill="hold" grpId="0" nodeType="afterEffect">
                                   <p:stCondLst>
                                     <p:cond delay="0"/>
                                   </p:stCondLst>
                                   <p:childTnLst>
                                     <p:set>
                                       <p:cBhvr>
-                                        <p:cTn id="47" dur="1" fill="hold">
+                                        <p:cTn id="42" dur="1" fill="hold">
                                           <p:stCondLst>
                                             <p:cond delay="0"/>
                                           </p:stCondLst>
@@ -10160,7 +10106,7 @@
                                     </p:set>
                                     <p:animEffect transition="in" filter="dissolve">
                                       <p:cBhvr>
-                                        <p:cTn id="48" dur="500"/>
+                                        <p:cTn id="43" dur="500"/>
                                         <p:tgtEl>
                                           <p:spTgt spid="272400"/>
                                         </p:tgtEl>
@@ -10173,20 +10119,20 @@
                           </p:cTn>
                         </p:par>
                         <p:par>
-                          <p:cTn id="49" fill="hold">
+                          <p:cTn id="44" fill="hold">
                             <p:stCondLst>
                               <p:cond delay="500"/>
                             </p:stCondLst>
                             <p:childTnLst>
                               <p:par>
-                                <p:cTn id="50" presetID="9" presetClass="entr" presetSubtype="0" fill="hold" grpId="0" nodeType="afterEffect">
+                                <p:cTn id="45" presetID="9" presetClass="entr" presetSubtype="0" fill="hold" grpId="0" nodeType="afterEffect">
                                   <p:stCondLst>
                                     <p:cond delay="0"/>
                                   </p:stCondLst>
                                   <p:childTnLst>
                                     <p:set>
                                       <p:cBhvr>
-                                        <p:cTn id="51" dur="1" fill="hold">
+                                        <p:cTn id="46" dur="1" fill="hold">
                                           <p:stCondLst>
                                             <p:cond delay="0"/>
                                           </p:stCondLst>
@@ -10204,7 +10150,7 @@
                                     </p:set>
                                     <p:animEffect transition="in" filter="dissolve">
                                       <p:cBhvr>
-                                        <p:cTn id="52" dur="500"/>
+                                        <p:cTn id="47" dur="500"/>
                                         <p:tgtEl>
                                           <p:spTgt spid="272402"/>
                                         </p:tgtEl>
@@ -10217,20 +10163,20 @@
                           </p:cTn>
                         </p:par>
                         <p:par>
-                          <p:cTn id="53" fill="hold">
+                          <p:cTn id="48" fill="hold">
                             <p:stCondLst>
                               <p:cond delay="1000"/>
                             </p:stCondLst>
                             <p:childTnLst>
                               <p:par>
-                                <p:cTn id="54" presetID="9" presetClass="entr" presetSubtype="0" fill="hold" grpId="0" nodeType="afterEffect">
+                                <p:cTn id="49" presetID="9" presetClass="entr" presetSubtype="0" fill="hold" grpId="0" nodeType="afterEffect">
                                   <p:stCondLst>
                                     <p:cond delay="0"/>
                                   </p:stCondLst>
                                   <p:childTnLst>
                                     <p:set>
                                       <p:cBhvr>
-                                        <p:cTn id="55" dur="1" fill="hold">
+                                        <p:cTn id="50" dur="1" fill="hold">
                                           <p:stCondLst>
                                             <p:cond delay="0"/>
                                           </p:stCondLst>
@@ -10248,7 +10194,7 @@
                                     </p:set>
                                     <p:animEffect transition="in" filter="dissolve">
                                       <p:cBhvr>
-                                        <p:cTn id="56" dur="500"/>
+                                        <p:cTn id="51" dur="500"/>
                                         <p:tgtEl>
                                           <p:spTgt spid="272403"/>
                                         </p:tgtEl>
@@ -10261,20 +10207,20 @@
                           </p:cTn>
                         </p:par>
                         <p:par>
-                          <p:cTn id="57" fill="hold">
+                          <p:cTn id="52" fill="hold">
                             <p:stCondLst>
                               <p:cond delay="1500"/>
                             </p:stCondLst>
                             <p:childTnLst>
                               <p:par>
-                                <p:cTn id="58" presetID="9" presetClass="entr" presetSubtype="0" fill="hold" grpId="0" nodeType="afterEffect">
+                                <p:cTn id="53" presetID="9" presetClass="entr" presetSubtype="0" fill="hold" grpId="0" nodeType="afterEffect">
                                   <p:stCondLst>
                                     <p:cond delay="0"/>
                                   </p:stCondLst>
                                   <p:childTnLst>
                                     <p:set>
                                       <p:cBhvr>
-                                        <p:cTn id="59" dur="1" fill="hold">
+                                        <p:cTn id="54" dur="1" fill="hold">
                                           <p:stCondLst>
                                             <p:cond delay="0"/>
                                           </p:stCondLst>
@@ -10292,7 +10238,7 @@
                                     </p:set>
                                     <p:animEffect transition="in" filter="dissolve">
                                       <p:cBhvr>
-                                        <p:cTn id="60" dur="500"/>
+                                        <p:cTn id="55" dur="500"/>
                                         <p:tgtEl>
                                           <p:spTgt spid="272401"/>
                                         </p:tgtEl>
@@ -10305,20 +10251,20 @@
                           </p:cTn>
                         </p:par>
                         <p:par>
-                          <p:cTn id="61" fill="hold">
+                          <p:cTn id="56" fill="hold">
                             <p:stCondLst>
                               <p:cond delay="2000"/>
                             </p:stCondLst>
                             <p:childTnLst>
                               <p:par>
-                                <p:cTn id="62" presetID="9" presetClass="entr" presetSubtype="0" fill="hold" grpId="0" nodeType="afterEffect">
+                                <p:cTn id="57" presetID="9" presetClass="entr" presetSubtype="0" fill="hold" grpId="0" nodeType="afterEffect">
                                   <p:stCondLst>
                                     <p:cond delay="0"/>
                                   </p:stCondLst>
                                   <p:childTnLst>
                                     <p:set>
                                       <p:cBhvr>
-                                        <p:cTn id="63" dur="1" fill="hold">
+                                        <p:cTn id="58" dur="1" fill="hold">
                                           <p:stCondLst>
                                             <p:cond delay="0"/>
                                           </p:stCondLst>
@@ -10336,7 +10282,7 @@
                                     </p:set>
                                     <p:animEffect transition="in" filter="dissolve">
                                       <p:cBhvr>
-                                        <p:cTn id="64" dur="500"/>
+                                        <p:cTn id="59" dur="500"/>
                                         <p:tgtEl>
                                           <p:spTgt spid="272404"/>
                                         </p:tgtEl>
@@ -11934,11 +11880,11 @@
   <p:clrMapOvr>
     <a:masterClrMapping/>
   </p:clrMapOvr>
-  <mc:AlternateContent xmlns:mc="http://schemas.openxmlformats.org/markup-compatibility/2006">
-    <mc:Choice xmlns:p14="http://schemas.microsoft.com/office/powerpoint/2010/main" Requires="p14">
+  <mc:AlternateContent xmlns:mc="http://schemas.openxmlformats.org/markup-compatibility/2006" xmlns:p14="http://schemas.microsoft.com/office/powerpoint/2010/main">
+    <mc:Choice Requires="p14">
       <p:transition spd="slow" p14:dur="2000"/>
     </mc:Choice>
-    <mc:Fallback>
+    <mc:Fallback xmlns="">
       <p:transition spd="slow"/>
     </mc:Fallback>
   </mc:AlternateContent>
@@ -12359,25 +12305,6 @@
       </p:sp>
       <p:sp>
         <p:nvSpPr>
-          <p:cNvPr id="3" name="Content Placeholder 2"/>
-          <p:cNvSpPr>
-            <a:spLocks noGrp="1"/>
-          </p:cNvSpPr>
-          <p:nvPr>
-            <p:ph idx="1"/>
-          </p:nvPr>
-        </p:nvSpPr>
-        <p:spPr/>
-        <p:txBody>
-          <a:bodyPr/>
-          <a:lstStyle/>
-          <a:p>
-            <a:endParaRPr lang="en-US"/>
-          </a:p>
-        </p:txBody>
-      </p:sp>
-      <p:sp>
-        <p:nvSpPr>
           <p:cNvPr id="4" name="Footer Placeholder 3"/>
           <p:cNvSpPr>
             <a:spLocks noGrp="1"/>
@@ -12423,10 +12350,208 @@
           </a:p>
         </p:txBody>
       </p:sp>
+      <p:sp>
+        <p:nvSpPr>
+          <p:cNvPr id="6" name="Title 1"/>
+          <p:cNvSpPr txBox="1">
+            <a:spLocks/>
+          </p:cNvSpPr>
+          <p:nvPr/>
+        </p:nvSpPr>
+        <p:spPr bwMode="auto">
+          <a:xfrm>
+            <a:off x="65088" y="2865438"/>
+            <a:ext cx="9012237" cy="868362"/>
+          </a:xfrm>
+          <a:prstGeom prst="rect">
+            <a:avLst/>
+          </a:prstGeom>
+          <a:noFill/>
+          <a:ln w="9525">
+            <a:noFill/>
+            <a:miter lim="800000"/>
+            <a:headEnd/>
+            <a:tailEnd/>
+          </a:ln>
+          <a:effectLst/>
+        </p:spPr>
+        <p:txBody>
+          <a:bodyPr vert="horz" wrap="square" lIns="91440" tIns="45720" rIns="91440" bIns="45720" numCol="1" anchor="ctr" anchorCtr="0" compatLnSpc="1">
+            <a:prstTxWarp prst="textNoShape">
+              <a:avLst/>
+            </a:prstTxWarp>
+          </a:bodyPr>
+          <a:lstStyle>
+            <a:lvl1pPr algn="ctr" rtl="0" fontAlgn="base">
+              <a:spcBef>
+                <a:spcPct val="0"/>
+              </a:spcBef>
+              <a:spcAft>
+                <a:spcPct val="0"/>
+              </a:spcAft>
+              <a:defRPr sz="4400">
+                <a:solidFill>
+                  <a:schemeClr val="tx2"/>
+                </a:solidFill>
+                <a:latin typeface="+mj-lt"/>
+                <a:ea typeface="+mj-ea"/>
+                <a:cs typeface="+mj-cs"/>
+              </a:defRPr>
+            </a:lvl1pPr>
+            <a:lvl2pPr algn="ctr" rtl="0" fontAlgn="base">
+              <a:spcBef>
+                <a:spcPct val="0"/>
+              </a:spcBef>
+              <a:spcAft>
+                <a:spcPct val="0"/>
+              </a:spcAft>
+              <a:defRPr sz="4400">
+                <a:solidFill>
+                  <a:schemeClr val="tx2"/>
+                </a:solidFill>
+                <a:latin typeface="Arial" charset="0"/>
+              </a:defRPr>
+            </a:lvl2pPr>
+            <a:lvl3pPr algn="ctr" rtl="0" fontAlgn="base">
+              <a:spcBef>
+                <a:spcPct val="0"/>
+              </a:spcBef>
+              <a:spcAft>
+                <a:spcPct val="0"/>
+              </a:spcAft>
+              <a:defRPr sz="4400">
+                <a:solidFill>
+                  <a:schemeClr val="tx2"/>
+                </a:solidFill>
+                <a:latin typeface="Arial" charset="0"/>
+              </a:defRPr>
+            </a:lvl3pPr>
+            <a:lvl4pPr algn="ctr" rtl="0" fontAlgn="base">
+              <a:spcBef>
+                <a:spcPct val="0"/>
+              </a:spcBef>
+              <a:spcAft>
+                <a:spcPct val="0"/>
+              </a:spcAft>
+              <a:defRPr sz="4400">
+                <a:solidFill>
+                  <a:schemeClr val="tx2"/>
+                </a:solidFill>
+                <a:latin typeface="Arial" charset="0"/>
+              </a:defRPr>
+            </a:lvl4pPr>
+            <a:lvl5pPr algn="ctr" rtl="0" fontAlgn="base">
+              <a:spcBef>
+                <a:spcPct val="0"/>
+              </a:spcBef>
+              <a:spcAft>
+                <a:spcPct val="0"/>
+              </a:spcAft>
+              <a:defRPr sz="4400">
+                <a:solidFill>
+                  <a:schemeClr val="tx2"/>
+                </a:solidFill>
+                <a:latin typeface="Arial" charset="0"/>
+              </a:defRPr>
+            </a:lvl5pPr>
+            <a:lvl6pPr marL="457200" algn="ctr" rtl="0" fontAlgn="base">
+              <a:spcBef>
+                <a:spcPct val="0"/>
+              </a:spcBef>
+              <a:spcAft>
+                <a:spcPct val="0"/>
+              </a:spcAft>
+              <a:defRPr sz="4400">
+                <a:solidFill>
+                  <a:schemeClr val="tx2"/>
+                </a:solidFill>
+                <a:latin typeface="Arial" charset="0"/>
+              </a:defRPr>
+            </a:lvl6pPr>
+            <a:lvl7pPr marL="914400" algn="ctr" rtl="0" fontAlgn="base">
+              <a:spcBef>
+                <a:spcPct val="0"/>
+              </a:spcBef>
+              <a:spcAft>
+                <a:spcPct val="0"/>
+              </a:spcAft>
+              <a:defRPr sz="4400">
+                <a:solidFill>
+                  <a:schemeClr val="tx2"/>
+                </a:solidFill>
+                <a:latin typeface="Arial" charset="0"/>
+              </a:defRPr>
+            </a:lvl7pPr>
+            <a:lvl8pPr marL="1371600" algn="ctr" rtl="0" fontAlgn="base">
+              <a:spcBef>
+                <a:spcPct val="0"/>
+              </a:spcBef>
+              <a:spcAft>
+                <a:spcPct val="0"/>
+              </a:spcAft>
+              <a:defRPr sz="4400">
+                <a:solidFill>
+                  <a:schemeClr val="tx2"/>
+                </a:solidFill>
+                <a:latin typeface="Arial" charset="0"/>
+              </a:defRPr>
+            </a:lvl8pPr>
+            <a:lvl9pPr marL="1828800" algn="ctr" rtl="0" fontAlgn="base">
+              <a:spcBef>
+                <a:spcPct val="0"/>
+              </a:spcBef>
+              <a:spcAft>
+                <a:spcPct val="0"/>
+              </a:spcAft>
+              <a:defRPr sz="4400">
+                <a:solidFill>
+                  <a:schemeClr val="tx2"/>
+                </a:solidFill>
+                <a:latin typeface="Arial" charset="0"/>
+              </a:defRPr>
+            </a:lvl9pPr>
+          </a:lstStyle>
+          <a:p>
+            <a:r>
+              <a:rPr lang="en-US" kern="0" dirty="0" smtClean="0"/>
+              <a:t>ALK Application Exercise</a:t>
+            </a:r>
+            <a:endParaRPr lang="en-US" kern="0" dirty="0"/>
+          </a:p>
+        </p:txBody>
+      </p:sp>
+      <p:sp>
+        <p:nvSpPr>
+          <p:cNvPr id="7" name="Content Placeholder 2"/>
+          <p:cNvSpPr>
+            <a:spLocks noGrp="1"/>
+          </p:cNvSpPr>
+          <p:nvPr>
+            <p:ph idx="1"/>
+          </p:nvPr>
+        </p:nvSpPr>
+        <p:spPr>
+          <a:xfrm>
+            <a:off x="457200" y="3886200"/>
+            <a:ext cx="8229600" cy="1981200"/>
+          </a:xfrm>
+        </p:spPr>
+        <p:txBody>
+          <a:bodyPr/>
+          <a:lstStyle/>
+          <a:p>
+            <a:r>
+              <a:rPr lang="en-US" dirty="0" smtClean="0"/>
+              <a:t>Complete 5.2</a:t>
+            </a:r>
+            <a:endParaRPr lang="en-US" dirty="0"/>
+          </a:p>
+        </p:txBody>
+      </p:sp>
     </p:spTree>
     <p:extLst>
       <p:ext uri="{BB962C8B-B14F-4D97-AF65-F5344CB8AC3E}">
-        <p14:creationId xmlns:p14="http://schemas.microsoft.com/office/powerpoint/2010/main" val="985928401"/>
+        <p14:creationId xmlns:p14="http://schemas.microsoft.com/office/powerpoint/2010/main" val="663468711"/>
       </p:ext>
     </p:extLst>
   </p:cSld>
@@ -12436,9 +12561,177 @@
   <p:timing>
     <p:tnLst>
       <p:par>
-        <p:cTn id="1" dur="indefinite" restart="never" nodeType="tmRoot"/>
+        <p:cTn id="1" dur="indefinite" restart="never" nodeType="tmRoot">
+          <p:childTnLst>
+            <p:seq concurrent="1" nextAc="seek">
+              <p:cTn id="2" dur="indefinite" nodeType="mainSeq">
+                <p:childTnLst>
+                  <p:par>
+                    <p:cTn id="3" fill="hold">
+                      <p:stCondLst>
+                        <p:cond delay="indefinite"/>
+                        <p:cond evt="onBegin" delay="0">
+                          <p:tn val="2"/>
+                        </p:cond>
+                      </p:stCondLst>
+                      <p:childTnLst>
+                        <p:par>
+                          <p:cTn id="4" fill="hold">
+                            <p:stCondLst>
+                              <p:cond delay="0"/>
+                            </p:stCondLst>
+                            <p:childTnLst>
+                              <p:par>
+                                <p:cTn id="5" presetID="1" presetClass="entr" presetSubtype="0" fill="hold" grpId="0" nodeType="withEffect">
+                                  <p:stCondLst>
+                                    <p:cond delay="0"/>
+                                  </p:stCondLst>
+                                  <p:childTnLst>
+                                    <p:set>
+                                      <p:cBhvr>
+                                        <p:cTn id="6" dur="1" fill="hold">
+                                          <p:stCondLst>
+                                            <p:cond delay="0"/>
+                                          </p:stCondLst>
+                                        </p:cTn>
+                                        <p:tgtEl>
+                                          <p:spTgt spid="2"/>
+                                        </p:tgtEl>
+                                        <p:attrNameLst>
+                                          <p:attrName>style.visibility</p:attrName>
+                                        </p:attrNameLst>
+                                      </p:cBhvr>
+                                      <p:to>
+                                        <p:strVal val="visible"/>
+                                      </p:to>
+                                    </p:set>
+                                  </p:childTnLst>
+                                  <p:subTnLst>
+                                    <p:animClr clrSpc="rgb" dir="cw">
+                                      <p:cBhvr override="childStyle">
+                                        <p:cTn dur="1" fill="hold" display="0" masterRel="nextClick" afterEffect="1"/>
+                                        <p:tgtEl>
+                                          <p:spTgt spid="2"/>
+                                        </p:tgtEl>
+                                        <p:attrNameLst>
+                                          <p:attrName>ppt_c</p:attrName>
+                                        </p:attrNameLst>
+                                      </p:cBhvr>
+                                      <p:to>
+                                        <a:srgbClr val="C0C0C0"/>
+                                      </p:to>
+                                    </p:animClr>
+                                  </p:subTnLst>
+                                </p:cTn>
+                              </p:par>
+                            </p:childTnLst>
+                          </p:cTn>
+                        </p:par>
+                      </p:childTnLst>
+                    </p:cTn>
+                  </p:par>
+                  <p:par>
+                    <p:cTn id="7" fill="hold">
+                      <p:stCondLst>
+                        <p:cond delay="indefinite"/>
+                      </p:stCondLst>
+                      <p:childTnLst>
+                        <p:par>
+                          <p:cTn id="8" fill="hold">
+                            <p:stCondLst>
+                              <p:cond delay="0"/>
+                            </p:stCondLst>
+                            <p:childTnLst>
+                              <p:par>
+                                <p:cTn id="9" presetID="1" presetClass="entr" presetSubtype="0" fill="hold" grpId="0" nodeType="clickEffect">
+                                  <p:stCondLst>
+                                    <p:cond delay="0"/>
+                                  </p:stCondLst>
+                                  <p:childTnLst>
+                                    <p:set>
+                                      <p:cBhvr>
+                                        <p:cTn id="10" dur="1" fill="hold">
+                                          <p:stCondLst>
+                                            <p:cond delay="0"/>
+                                          </p:stCondLst>
+                                        </p:cTn>
+                                        <p:tgtEl>
+                                          <p:spTgt spid="6"/>
+                                        </p:tgtEl>
+                                        <p:attrNameLst>
+                                          <p:attrName>style.visibility</p:attrName>
+                                        </p:attrNameLst>
+                                      </p:cBhvr>
+                                      <p:to>
+                                        <p:strVal val="visible"/>
+                                      </p:to>
+                                    </p:set>
+                                  </p:childTnLst>
+                                </p:cTn>
+                              </p:par>
+                              <p:par>
+                                <p:cTn id="11" presetID="1" presetClass="entr" presetSubtype="0" fill="hold" grpId="0" nodeType="withEffect">
+                                  <p:stCondLst>
+                                    <p:cond delay="0"/>
+                                  </p:stCondLst>
+                                  <p:childTnLst>
+                                    <p:set>
+                                      <p:cBhvr>
+                                        <p:cTn id="12" dur="1" fill="hold">
+                                          <p:stCondLst>
+                                            <p:cond delay="0"/>
+                                          </p:stCondLst>
+                                        </p:cTn>
+                                        <p:tgtEl>
+                                          <p:spTgt spid="7">
+                                            <p:txEl>
+                                              <p:pRg st="0" end="0"/>
+                                            </p:txEl>
+                                          </p:spTgt>
+                                        </p:tgtEl>
+                                        <p:attrNameLst>
+                                          <p:attrName>style.visibility</p:attrName>
+                                        </p:attrNameLst>
+                                      </p:cBhvr>
+                                      <p:to>
+                                        <p:strVal val="visible"/>
+                                      </p:to>
+                                    </p:set>
+                                  </p:childTnLst>
+                                </p:cTn>
+                              </p:par>
+                            </p:childTnLst>
+                          </p:cTn>
+                        </p:par>
+                      </p:childTnLst>
+                    </p:cTn>
+                  </p:par>
+                </p:childTnLst>
+              </p:cTn>
+              <p:prevCondLst>
+                <p:cond evt="onPrev" delay="0">
+                  <p:tgtEl>
+                    <p:sldTgt/>
+                  </p:tgtEl>
+                </p:cond>
+              </p:prevCondLst>
+              <p:nextCondLst>
+                <p:cond evt="onNext" delay="0">
+                  <p:tgtEl>
+                    <p:sldTgt/>
+                  </p:tgtEl>
+                </p:cond>
+              </p:nextCondLst>
+            </p:seq>
+          </p:childTnLst>
+        </p:cTn>
       </p:par>
     </p:tnLst>
+    <p:bldLst>
+      <p:bldP spid="2" grpId="0"/>
+      <p:bldP spid="6" grpId="0"/>
+      <p:bldP spid="7" grpId="0" build="p"/>
+    </p:bldLst>
   </p:timing>
 </p:sld>
 </file>
@@ -12678,15 +12971,7 @@
                   <a:schemeClr val="accent2"/>
                 </a:solidFill>
               </a:rPr>
-              <a:t>key</a:t>
-            </a:r>
-            <a:r>
-              <a:rPr lang="en-US" sz="2400" b="1" i="1" dirty="0" smtClean="0">
-                <a:solidFill>
-                  <a:schemeClr val="accent2"/>
-                </a:solidFill>
-              </a:rPr>
-              <a:t>.</a:t>
+              <a:t>key.</a:t>
             </a:r>
           </a:p>
           <a:p>
@@ -17279,25 +17564,6 @@
       </p:sp>
       <p:sp>
         <p:nvSpPr>
-          <p:cNvPr id="3" name="Content Placeholder 2"/>
-          <p:cNvSpPr>
-            <a:spLocks noGrp="1"/>
-          </p:cNvSpPr>
-          <p:nvPr>
-            <p:ph idx="1"/>
-          </p:nvPr>
-        </p:nvSpPr>
-        <p:spPr/>
-        <p:txBody>
-          <a:bodyPr/>
-          <a:lstStyle/>
-          <a:p>
-            <a:endParaRPr lang="en-US"/>
-          </a:p>
-        </p:txBody>
-      </p:sp>
-      <p:sp>
-        <p:nvSpPr>
           <p:cNvPr id="4" name="Footer Placeholder 3"/>
           <p:cNvSpPr>
             <a:spLocks noGrp="1"/>
@@ -17343,6 +17609,204 @@
           </a:p>
         </p:txBody>
       </p:sp>
+      <p:sp>
+        <p:nvSpPr>
+          <p:cNvPr id="6" name="Title 1"/>
+          <p:cNvSpPr txBox="1">
+            <a:spLocks/>
+          </p:cNvSpPr>
+          <p:nvPr/>
+        </p:nvSpPr>
+        <p:spPr bwMode="auto">
+          <a:xfrm>
+            <a:off x="65088" y="2865438"/>
+            <a:ext cx="9012237" cy="868362"/>
+          </a:xfrm>
+          <a:prstGeom prst="rect">
+            <a:avLst/>
+          </a:prstGeom>
+          <a:noFill/>
+          <a:ln w="9525">
+            <a:noFill/>
+            <a:miter lim="800000"/>
+            <a:headEnd/>
+            <a:tailEnd/>
+          </a:ln>
+          <a:effectLst/>
+        </p:spPr>
+        <p:txBody>
+          <a:bodyPr vert="horz" wrap="square" lIns="91440" tIns="45720" rIns="91440" bIns="45720" numCol="1" anchor="ctr" anchorCtr="0" compatLnSpc="1">
+            <a:prstTxWarp prst="textNoShape">
+              <a:avLst/>
+            </a:prstTxWarp>
+          </a:bodyPr>
+          <a:lstStyle>
+            <a:lvl1pPr algn="ctr" rtl="0" fontAlgn="base">
+              <a:spcBef>
+                <a:spcPct val="0"/>
+              </a:spcBef>
+              <a:spcAft>
+                <a:spcPct val="0"/>
+              </a:spcAft>
+              <a:defRPr sz="4400">
+                <a:solidFill>
+                  <a:schemeClr val="tx2"/>
+                </a:solidFill>
+                <a:latin typeface="+mj-lt"/>
+                <a:ea typeface="+mj-ea"/>
+                <a:cs typeface="+mj-cs"/>
+              </a:defRPr>
+            </a:lvl1pPr>
+            <a:lvl2pPr algn="ctr" rtl="0" fontAlgn="base">
+              <a:spcBef>
+                <a:spcPct val="0"/>
+              </a:spcBef>
+              <a:spcAft>
+                <a:spcPct val="0"/>
+              </a:spcAft>
+              <a:defRPr sz="4400">
+                <a:solidFill>
+                  <a:schemeClr val="tx2"/>
+                </a:solidFill>
+                <a:latin typeface="Arial" charset="0"/>
+              </a:defRPr>
+            </a:lvl2pPr>
+            <a:lvl3pPr algn="ctr" rtl="0" fontAlgn="base">
+              <a:spcBef>
+                <a:spcPct val="0"/>
+              </a:spcBef>
+              <a:spcAft>
+                <a:spcPct val="0"/>
+              </a:spcAft>
+              <a:defRPr sz="4400">
+                <a:solidFill>
+                  <a:schemeClr val="tx2"/>
+                </a:solidFill>
+                <a:latin typeface="Arial" charset="0"/>
+              </a:defRPr>
+            </a:lvl3pPr>
+            <a:lvl4pPr algn="ctr" rtl="0" fontAlgn="base">
+              <a:spcBef>
+                <a:spcPct val="0"/>
+              </a:spcBef>
+              <a:spcAft>
+                <a:spcPct val="0"/>
+              </a:spcAft>
+              <a:defRPr sz="4400">
+                <a:solidFill>
+                  <a:schemeClr val="tx2"/>
+                </a:solidFill>
+                <a:latin typeface="Arial" charset="0"/>
+              </a:defRPr>
+            </a:lvl4pPr>
+            <a:lvl5pPr algn="ctr" rtl="0" fontAlgn="base">
+              <a:spcBef>
+                <a:spcPct val="0"/>
+              </a:spcBef>
+              <a:spcAft>
+                <a:spcPct val="0"/>
+              </a:spcAft>
+              <a:defRPr sz="4400">
+                <a:solidFill>
+                  <a:schemeClr val="tx2"/>
+                </a:solidFill>
+                <a:latin typeface="Arial" charset="0"/>
+              </a:defRPr>
+            </a:lvl5pPr>
+            <a:lvl6pPr marL="457200" algn="ctr" rtl="0" fontAlgn="base">
+              <a:spcBef>
+                <a:spcPct val="0"/>
+              </a:spcBef>
+              <a:spcAft>
+                <a:spcPct val="0"/>
+              </a:spcAft>
+              <a:defRPr sz="4400">
+                <a:solidFill>
+                  <a:schemeClr val="tx2"/>
+                </a:solidFill>
+                <a:latin typeface="Arial" charset="0"/>
+              </a:defRPr>
+            </a:lvl6pPr>
+            <a:lvl7pPr marL="914400" algn="ctr" rtl="0" fontAlgn="base">
+              <a:spcBef>
+                <a:spcPct val="0"/>
+              </a:spcBef>
+              <a:spcAft>
+                <a:spcPct val="0"/>
+              </a:spcAft>
+              <a:defRPr sz="4400">
+                <a:solidFill>
+                  <a:schemeClr val="tx2"/>
+                </a:solidFill>
+                <a:latin typeface="Arial" charset="0"/>
+              </a:defRPr>
+            </a:lvl7pPr>
+            <a:lvl8pPr marL="1371600" algn="ctr" rtl="0" fontAlgn="base">
+              <a:spcBef>
+                <a:spcPct val="0"/>
+              </a:spcBef>
+              <a:spcAft>
+                <a:spcPct val="0"/>
+              </a:spcAft>
+              <a:defRPr sz="4400">
+                <a:solidFill>
+                  <a:schemeClr val="tx2"/>
+                </a:solidFill>
+                <a:latin typeface="Arial" charset="0"/>
+              </a:defRPr>
+            </a:lvl8pPr>
+            <a:lvl9pPr marL="1828800" algn="ctr" rtl="0" fontAlgn="base">
+              <a:spcBef>
+                <a:spcPct val="0"/>
+              </a:spcBef>
+              <a:spcAft>
+                <a:spcPct val="0"/>
+              </a:spcAft>
+              <a:defRPr sz="4400">
+                <a:solidFill>
+                  <a:schemeClr val="tx2"/>
+                </a:solidFill>
+                <a:latin typeface="Arial" charset="0"/>
+              </a:defRPr>
+            </a:lvl9pPr>
+          </a:lstStyle>
+          <a:p>
+            <a:r>
+              <a:rPr lang="en-US" kern="0" dirty="0" smtClean="0"/>
+              <a:t>ALK Construction Exercise</a:t>
+            </a:r>
+            <a:endParaRPr lang="en-US" kern="0" dirty="0"/>
+          </a:p>
+        </p:txBody>
+      </p:sp>
+      <p:sp>
+        <p:nvSpPr>
+          <p:cNvPr id="7" name="Content Placeholder 2"/>
+          <p:cNvSpPr>
+            <a:spLocks noGrp="1"/>
+          </p:cNvSpPr>
+          <p:nvPr>
+            <p:ph idx="1"/>
+          </p:nvPr>
+        </p:nvSpPr>
+        <p:spPr>
+          <a:xfrm>
+            <a:off x="457200" y="3886200"/>
+            <a:ext cx="8229600" cy="1981200"/>
+          </a:xfrm>
+        </p:spPr>
+        <p:txBody>
+          <a:bodyPr/>
+          <a:lstStyle/>
+          <a:p>
+            <a:r>
+              <a:rPr lang="en-US" dirty="0" smtClean="0"/>
+              <a:t>Complete 5.1</a:t>
+            </a:r>
+            <a:endParaRPr lang="en-US" dirty="0"/>
+          </a:p>
+        </p:txBody>
+      </p:sp>
     </p:spTree>
     <p:extLst>
       <p:ext uri="{BB962C8B-B14F-4D97-AF65-F5344CB8AC3E}">
@@ -17356,9 +17820,177 @@
   <p:timing>
     <p:tnLst>
       <p:par>
-        <p:cTn id="1" dur="indefinite" restart="never" nodeType="tmRoot"/>
+        <p:cTn id="1" dur="indefinite" restart="never" nodeType="tmRoot">
+          <p:childTnLst>
+            <p:seq concurrent="1" nextAc="seek">
+              <p:cTn id="2" dur="indefinite" nodeType="mainSeq">
+                <p:childTnLst>
+                  <p:par>
+                    <p:cTn id="3" fill="hold">
+                      <p:stCondLst>
+                        <p:cond delay="indefinite"/>
+                        <p:cond evt="onBegin" delay="0">
+                          <p:tn val="2"/>
+                        </p:cond>
+                      </p:stCondLst>
+                      <p:childTnLst>
+                        <p:par>
+                          <p:cTn id="4" fill="hold">
+                            <p:stCondLst>
+                              <p:cond delay="0"/>
+                            </p:stCondLst>
+                            <p:childTnLst>
+                              <p:par>
+                                <p:cTn id="5" presetID="1" presetClass="entr" presetSubtype="0" fill="hold" grpId="0" nodeType="withEffect">
+                                  <p:stCondLst>
+                                    <p:cond delay="0"/>
+                                  </p:stCondLst>
+                                  <p:childTnLst>
+                                    <p:set>
+                                      <p:cBhvr>
+                                        <p:cTn id="6" dur="1" fill="hold">
+                                          <p:stCondLst>
+                                            <p:cond delay="0"/>
+                                          </p:stCondLst>
+                                        </p:cTn>
+                                        <p:tgtEl>
+                                          <p:spTgt spid="2"/>
+                                        </p:tgtEl>
+                                        <p:attrNameLst>
+                                          <p:attrName>style.visibility</p:attrName>
+                                        </p:attrNameLst>
+                                      </p:cBhvr>
+                                      <p:to>
+                                        <p:strVal val="visible"/>
+                                      </p:to>
+                                    </p:set>
+                                  </p:childTnLst>
+                                  <p:subTnLst>
+                                    <p:animClr clrSpc="rgb" dir="cw">
+                                      <p:cBhvr override="childStyle">
+                                        <p:cTn dur="1" fill="hold" display="0" masterRel="nextClick" afterEffect="1"/>
+                                        <p:tgtEl>
+                                          <p:spTgt spid="2"/>
+                                        </p:tgtEl>
+                                        <p:attrNameLst>
+                                          <p:attrName>ppt_c</p:attrName>
+                                        </p:attrNameLst>
+                                      </p:cBhvr>
+                                      <p:to>
+                                        <a:srgbClr val="C0C0C0"/>
+                                      </p:to>
+                                    </p:animClr>
+                                  </p:subTnLst>
+                                </p:cTn>
+                              </p:par>
+                            </p:childTnLst>
+                          </p:cTn>
+                        </p:par>
+                      </p:childTnLst>
+                    </p:cTn>
+                  </p:par>
+                  <p:par>
+                    <p:cTn id="7" fill="hold">
+                      <p:stCondLst>
+                        <p:cond delay="indefinite"/>
+                      </p:stCondLst>
+                      <p:childTnLst>
+                        <p:par>
+                          <p:cTn id="8" fill="hold">
+                            <p:stCondLst>
+                              <p:cond delay="0"/>
+                            </p:stCondLst>
+                            <p:childTnLst>
+                              <p:par>
+                                <p:cTn id="9" presetID="1" presetClass="entr" presetSubtype="0" fill="hold" grpId="0" nodeType="clickEffect">
+                                  <p:stCondLst>
+                                    <p:cond delay="0"/>
+                                  </p:stCondLst>
+                                  <p:childTnLst>
+                                    <p:set>
+                                      <p:cBhvr>
+                                        <p:cTn id="10" dur="1" fill="hold">
+                                          <p:stCondLst>
+                                            <p:cond delay="0"/>
+                                          </p:stCondLst>
+                                        </p:cTn>
+                                        <p:tgtEl>
+                                          <p:spTgt spid="6"/>
+                                        </p:tgtEl>
+                                        <p:attrNameLst>
+                                          <p:attrName>style.visibility</p:attrName>
+                                        </p:attrNameLst>
+                                      </p:cBhvr>
+                                      <p:to>
+                                        <p:strVal val="visible"/>
+                                      </p:to>
+                                    </p:set>
+                                  </p:childTnLst>
+                                </p:cTn>
+                              </p:par>
+                              <p:par>
+                                <p:cTn id="11" presetID="1" presetClass="entr" presetSubtype="0" fill="hold" grpId="0" nodeType="withEffect">
+                                  <p:stCondLst>
+                                    <p:cond delay="0"/>
+                                  </p:stCondLst>
+                                  <p:childTnLst>
+                                    <p:set>
+                                      <p:cBhvr>
+                                        <p:cTn id="12" dur="1" fill="hold">
+                                          <p:stCondLst>
+                                            <p:cond delay="0"/>
+                                          </p:stCondLst>
+                                        </p:cTn>
+                                        <p:tgtEl>
+                                          <p:spTgt spid="7">
+                                            <p:txEl>
+                                              <p:pRg st="0" end="0"/>
+                                            </p:txEl>
+                                          </p:spTgt>
+                                        </p:tgtEl>
+                                        <p:attrNameLst>
+                                          <p:attrName>style.visibility</p:attrName>
+                                        </p:attrNameLst>
+                                      </p:cBhvr>
+                                      <p:to>
+                                        <p:strVal val="visible"/>
+                                      </p:to>
+                                    </p:set>
+                                  </p:childTnLst>
+                                </p:cTn>
+                              </p:par>
+                            </p:childTnLst>
+                          </p:cTn>
+                        </p:par>
+                      </p:childTnLst>
+                    </p:cTn>
+                  </p:par>
+                </p:childTnLst>
+              </p:cTn>
+              <p:prevCondLst>
+                <p:cond evt="onPrev" delay="0">
+                  <p:tgtEl>
+                    <p:sldTgt/>
+                  </p:tgtEl>
+                </p:cond>
+              </p:prevCondLst>
+              <p:nextCondLst>
+                <p:cond evt="onNext" delay="0">
+                  <p:tgtEl>
+                    <p:sldTgt/>
+                  </p:tgtEl>
+                </p:cond>
+              </p:nextCondLst>
+            </p:seq>
+          </p:childTnLst>
+        </p:cTn>
       </p:par>
     </p:tnLst>
+    <p:bldLst>
+      <p:bldP spid="2" grpId="0"/>
+      <p:bldP spid="6" grpId="0"/>
+      <p:bldP spid="7" grpId="0" build="p"/>
+    </p:bldLst>
   </p:timing>
 </p:sld>
 </file>
@@ -17741,25 +18373,36 @@
             </a:pPr>
             <a:r>
               <a:rPr lang="en-US" sz="2400" dirty="0" smtClean="0"/>
-              <a:t>Use age-length key to “assign” age to these fish</a:t>
-            </a:r>
+              <a:t>Use age-length key to “assign” age to these fish.</a:t>
+            </a:r>
+            <a:endParaRPr lang="en-US" dirty="0"/>
+          </a:p>
+          <a:p>
+            <a:pPr lvl="1">
+              <a:lnSpc>
+                <a:spcPct val="90000"/>
+              </a:lnSpc>
+            </a:pPr>
             <a:r>
               <a:rPr lang="en-US" sz="2400" dirty="0" smtClean="0"/>
-              <a:t>.</a:t>
-            </a:r>
-            <a:endParaRPr lang="en-US" dirty="0"/>
-          </a:p>
-          <a:p>
-            <a:pPr lvl="1">
-              <a:lnSpc>
-                <a:spcPct val="90000"/>
-              </a:lnSpc>
-            </a:pPr>
+              <a:t>Isermann </a:t>
+            </a:r>
             <a:r>
               <a:rPr lang="en-US" sz="2400" dirty="0" smtClean="0"/>
-              <a:t>Isermann &amp; Knight method actually assigns ages to each individual fish.</a:t>
-            </a:r>
-            <a:endParaRPr lang="en-US" sz="2400" dirty="0" smtClean="0"/>
+              <a:t>and </a:t>
+            </a:r>
+            <a:r>
+              <a:rPr lang="en-US" sz="2400" dirty="0" smtClean="0"/>
+              <a:t>Knight </a:t>
+            </a:r>
+            <a:r>
+              <a:rPr lang="en-US" sz="2400" dirty="0" smtClean="0"/>
+              <a:t>(2005) method </a:t>
+            </a:r>
+            <a:r>
+              <a:rPr lang="en-US" sz="2400" dirty="0" smtClean="0"/>
+              <a:t>actually assigns ages to each individual fish.</a:t>
+            </a:r>
           </a:p>
         </p:txBody>
       </p:sp>
@@ -19647,10 +20290,10 @@
               <a:t>assign these </a:t>
             </a:r>
             <a:r>
-              <a:rPr lang="en-US" sz="2400" dirty="0">
+              <a:rPr lang="en-US" sz="2400" dirty="0" smtClean="0">
                 <a:sym typeface="Wingdings" pitchFamily="2" charset="2"/>
               </a:rPr>
-              <a:t>ages.</a:t>
+              <a:t>ages</a:t>
             </a:r>
             <a:endParaRPr lang="en-US" sz="2400" dirty="0"/>
           </a:p>
@@ -20358,30 +21001,21 @@
                             </p:childTnLst>
                           </p:cTn>
                         </p:par>
-                      </p:childTnLst>
-                    </p:cTn>
-                  </p:par>
-                  <p:par>
-                    <p:cTn id="15" fill="hold">
-                      <p:stCondLst>
-                        <p:cond delay="indefinite"/>
-                      </p:stCondLst>
-                      <p:childTnLst>
                         <p:par>
-                          <p:cTn id="16" fill="hold">
+                          <p:cTn id="15" fill="hold">
                             <p:stCondLst>
                               <p:cond delay="0"/>
                             </p:stCondLst>
                             <p:childTnLst>
                               <p:par>
-                                <p:cTn id="17" presetID="1" presetClass="entr" presetSubtype="0" fill="hold" grpId="0" nodeType="clickEffect">
+                                <p:cTn id="16" presetID="1" presetClass="entr" presetSubtype="0" fill="hold" grpId="0" nodeType="afterEffect">
                                   <p:stCondLst>
-                                    <p:cond delay="0"/>
+                                    <p:cond delay="500"/>
                                   </p:stCondLst>
                                   <p:childTnLst>
                                     <p:set>
                                       <p:cBhvr>
-                                        <p:cTn id="18" dur="1" fill="hold">
+                                        <p:cTn id="17" dur="1" fill="hold">
                                           <p:stCondLst>
                                             <p:cond delay="0"/>
                                           </p:stCondLst>
@@ -20407,30 +21041,21 @@
                             </p:childTnLst>
                           </p:cTn>
                         </p:par>
-                      </p:childTnLst>
-                    </p:cTn>
-                  </p:par>
-                  <p:par>
-                    <p:cTn id="19" fill="hold">
-                      <p:stCondLst>
-                        <p:cond delay="indefinite"/>
-                      </p:stCondLst>
-                      <p:childTnLst>
                         <p:par>
-                          <p:cTn id="20" fill="hold">
+                          <p:cTn id="18" fill="hold">
                             <p:stCondLst>
-                              <p:cond delay="0"/>
+                              <p:cond delay="500"/>
                             </p:stCondLst>
                             <p:childTnLst>
                               <p:par>
-                                <p:cTn id="21" presetID="1" presetClass="entr" presetSubtype="0" fill="hold" grpId="0" nodeType="clickEffect">
+                                <p:cTn id="19" presetID="1" presetClass="entr" presetSubtype="0" fill="hold" grpId="0" nodeType="afterEffect">
                                   <p:stCondLst>
-                                    <p:cond delay="0"/>
+                                    <p:cond delay="500"/>
                                   </p:stCondLst>
                                   <p:childTnLst>
                                     <p:set>
                                       <p:cBhvr>
-                                        <p:cTn id="22" dur="1" fill="hold">
+                                        <p:cTn id="20" dur="1" fill="hold">
                                           <p:stCondLst>
                                             <p:cond delay="0"/>
                                           </p:stCondLst>
@@ -20460,26 +21085,26 @@
                     </p:cTn>
                   </p:par>
                   <p:par>
-                    <p:cTn id="23" fill="hold">
+                    <p:cTn id="21" fill="hold">
                       <p:stCondLst>
                         <p:cond delay="indefinite"/>
                       </p:stCondLst>
                       <p:childTnLst>
                         <p:par>
-                          <p:cTn id="24" fill="hold">
+                          <p:cTn id="22" fill="hold">
                             <p:stCondLst>
                               <p:cond delay="0"/>
                             </p:stCondLst>
                             <p:childTnLst>
                               <p:par>
-                                <p:cTn id="25" presetID="1" presetClass="entr" presetSubtype="0" fill="hold" grpId="0" nodeType="clickEffect">
+                                <p:cTn id="23" presetID="1" presetClass="entr" presetSubtype="0" fill="hold" grpId="0" nodeType="clickEffect">
                                   <p:stCondLst>
                                     <p:cond delay="0"/>
                                   </p:stCondLst>
                                   <p:childTnLst>
                                     <p:set>
                                       <p:cBhvr>
-                                        <p:cTn id="26" dur="1" fill="hold">
+                                        <p:cTn id="24" dur="1" fill="hold">
                                           <p:stCondLst>
                                             <p:cond delay="0"/>
                                           </p:stCondLst>
@@ -20509,26 +21134,26 @@
                     </p:cTn>
                   </p:par>
                   <p:par>
-                    <p:cTn id="27" fill="hold">
+                    <p:cTn id="25" fill="hold">
                       <p:stCondLst>
                         <p:cond delay="indefinite"/>
                       </p:stCondLst>
                       <p:childTnLst>
                         <p:par>
-                          <p:cTn id="28" fill="hold">
+                          <p:cTn id="26" fill="hold">
                             <p:stCondLst>
                               <p:cond delay="0"/>
                             </p:stCondLst>
                             <p:childTnLst>
                               <p:par>
-                                <p:cTn id="29" presetID="9" presetClass="entr" presetSubtype="0" fill="hold" grpId="0" nodeType="clickEffect">
+                                <p:cTn id="27" presetID="9" presetClass="entr" presetSubtype="0" fill="hold" grpId="0" nodeType="clickEffect">
                                   <p:stCondLst>
                                     <p:cond delay="0"/>
                                   </p:stCondLst>
                                   <p:childTnLst>
                                     <p:set>
                                       <p:cBhvr>
-                                        <p:cTn id="30" dur="1" fill="hold">
+                                        <p:cTn id="28" dur="1" fill="hold">
                                           <p:stCondLst>
                                             <p:cond delay="0"/>
                                           </p:stCondLst>
@@ -20546,7 +21171,7 @@
                                     </p:set>
                                     <p:animEffect transition="in" filter="dissolve">
                                       <p:cBhvr>
-                                        <p:cTn id="31" dur="500"/>
+                                        <p:cTn id="29" dur="500"/>
                                         <p:tgtEl>
                                           <p:spTgt spid="267272"/>
                                         </p:tgtEl>
@@ -20559,20 +21184,20 @@
                           </p:cTn>
                         </p:par>
                         <p:par>
-                          <p:cTn id="32" fill="hold">
+                          <p:cTn id="30" fill="hold">
                             <p:stCondLst>
                               <p:cond delay="500"/>
                             </p:stCondLst>
                             <p:childTnLst>
                               <p:par>
-                                <p:cTn id="33" presetID="9" presetClass="entr" presetSubtype="0" fill="hold" grpId="0" nodeType="afterEffect">
+                                <p:cTn id="31" presetID="9" presetClass="entr" presetSubtype="0" fill="hold" grpId="0" nodeType="afterEffect">
                                   <p:stCondLst>
                                     <p:cond delay="0"/>
                                   </p:stCondLst>
                                   <p:childTnLst>
                                     <p:set>
                                       <p:cBhvr>
-                                        <p:cTn id="34" dur="1" fill="hold">
+                                        <p:cTn id="32" dur="1" fill="hold">
                                           <p:stCondLst>
                                             <p:cond delay="0"/>
                                           </p:stCondLst>
@@ -20590,7 +21215,7 @@
                                     </p:set>
                                     <p:animEffect transition="in" filter="dissolve">
                                       <p:cBhvr>
-                                        <p:cTn id="35" dur="500"/>
+                                        <p:cTn id="33" dur="500"/>
                                         <p:tgtEl>
                                           <p:spTgt spid="267273"/>
                                         </p:tgtEl>
@@ -20603,20 +21228,20 @@
                           </p:cTn>
                         </p:par>
                         <p:par>
-                          <p:cTn id="36" fill="hold">
+                          <p:cTn id="34" fill="hold">
                             <p:stCondLst>
                               <p:cond delay="1000"/>
                             </p:stCondLst>
                             <p:childTnLst>
                               <p:par>
-                                <p:cTn id="37" presetID="9" presetClass="entr" presetSubtype="0" fill="hold" grpId="0" nodeType="afterEffect">
+                                <p:cTn id="35" presetID="9" presetClass="entr" presetSubtype="0" fill="hold" grpId="0" nodeType="afterEffect">
                                   <p:stCondLst>
                                     <p:cond delay="0"/>
                                   </p:stCondLst>
                                   <p:childTnLst>
                                     <p:set>
                                       <p:cBhvr>
-                                        <p:cTn id="38" dur="1" fill="hold">
+                                        <p:cTn id="36" dur="1" fill="hold">
                                           <p:stCondLst>
                                             <p:cond delay="0"/>
                                           </p:stCondLst>
@@ -20634,7 +21259,7 @@
                                     </p:set>
                                     <p:animEffect transition="in" filter="dissolve">
                                       <p:cBhvr>
-                                        <p:cTn id="39" dur="500"/>
+                                        <p:cTn id="37" dur="500"/>
                                         <p:tgtEl>
                                           <p:spTgt spid="267270"/>
                                         </p:tgtEl>
@@ -20647,20 +21272,20 @@
                           </p:cTn>
                         </p:par>
                         <p:par>
-                          <p:cTn id="40" fill="hold">
+                          <p:cTn id="38" fill="hold">
                             <p:stCondLst>
                               <p:cond delay="1500"/>
                             </p:stCondLst>
                             <p:childTnLst>
                               <p:par>
-                                <p:cTn id="41" presetID="9" presetClass="entr" presetSubtype="0" fill="hold" grpId="0" nodeType="afterEffect">
+                                <p:cTn id="39" presetID="9" presetClass="entr" presetSubtype="0" fill="hold" grpId="0" nodeType="afterEffect">
                                   <p:stCondLst>
                                     <p:cond delay="0"/>
                                   </p:stCondLst>
                                   <p:childTnLst>
                                     <p:set>
                                       <p:cBhvr>
-                                        <p:cTn id="42" dur="1" fill="hold">
+                                        <p:cTn id="40" dur="1" fill="hold">
                                           <p:stCondLst>
                                             <p:cond delay="0"/>
                                           </p:stCondLst>
@@ -20678,7 +21303,7 @@
                                     </p:set>
                                     <p:animEffect transition="in" filter="dissolve">
                                       <p:cBhvr>
-                                        <p:cTn id="43" dur="500"/>
+                                        <p:cTn id="41" dur="500"/>
                                         <p:tgtEl>
                                           <p:spTgt spid="267271"/>
                                         </p:tgtEl>

</xml_diff>